<commit_message>
a few notebook changes
</commit_message>
<xml_diff>
--- a/Lectures/Day5_7lecture_Modpath.pptx
+++ b/Lectures/Day5_7lecture_Modpath.pptx
@@ -5,7 +5,7 @@
     <p:sldMasterId id="2147483648" r:id="rId1"/>
   </p:sldMasterIdLst>
   <p:notesMasterIdLst>
-    <p:notesMasterId r:id="rId21"/>
+    <p:notesMasterId r:id="rId22"/>
   </p:notesMasterIdLst>
   <p:sldIdLst>
     <p:sldId id="267" r:id="rId2"/>
@@ -26,7 +26,8 @@
     <p:sldId id="273" r:id="rId17"/>
     <p:sldId id="272" r:id="rId18"/>
     <p:sldId id="275" r:id="rId19"/>
-    <p:sldId id="274" r:id="rId20"/>
+    <p:sldId id="276" r:id="rId20"/>
+    <p:sldId id="274" r:id="rId21"/>
   </p:sldIdLst>
   <p:sldSz cx="9144000" cy="6858000" type="screen4x3"/>
   <p:notesSz cx="6858000" cy="9144000"/>
@@ -264,7 +265,7 @@
           <a:p>
             <a:fld id="{1C36FEBF-4527-4FE8-96A7-ED67B675D6DB}" type="datetimeFigureOut">
               <a:rPr lang="en-US" smtClean="0"/>
-              <a:t>1/5/2023</a:t>
+              <a:t>1/13/2023</a:t>
             </a:fld>
             <a:endParaRPr lang="en-US"/>
           </a:p>
@@ -596,7 +597,7 @@
           <a:p>
             <a:fld id="{250FA1EE-1356-4992-842D-52AFC42108E3}" type="slidenum">
               <a:rPr lang="en-US" smtClean="0"/>
-              <a:t>14</a:t>
+              <a:t>1</a:t>
             </a:fld>
             <a:endParaRPr lang="en-US"/>
           </a:p>
@@ -605,7 +606,7 @@
     </p:spTree>
     <p:extLst>
       <p:ext uri="{BB962C8B-B14F-4D97-AF65-F5344CB8AC3E}">
-        <p14:creationId xmlns:p14="http://schemas.microsoft.com/office/powerpoint/2010/main" val="1675685290"/>
+        <p14:creationId xmlns:p14="http://schemas.microsoft.com/office/powerpoint/2010/main" val="2935853501"/>
       </p:ext>
     </p:extLst>
   </p:cSld>
@@ -659,18 +660,7 @@
           <a:bodyPr/>
           <a:lstStyle/>
           <a:p>
-            <a:r>
-              <a:rPr lang="en-US" dirty="0"/>
-              <a:t>“simulation type” refers to: “</a:t>
-            </a:r>
-            <a:r>
-              <a:rPr lang="en-US" dirty="0" err="1"/>
-              <a:t>pathline</a:t>
-            </a:r>
-            <a:r>
-              <a:rPr lang="en-US" dirty="0"/>
-              <a:t>”, “endpoint”, “timeseries”, combined.</a:t>
-            </a:r>
+            <a:endParaRPr lang="en-US" dirty="0"/>
           </a:p>
         </p:txBody>
       </p:sp>
@@ -691,7 +681,7 @@
           <a:p>
             <a:fld id="{250FA1EE-1356-4992-842D-52AFC42108E3}" type="slidenum">
               <a:rPr lang="en-US" smtClean="0"/>
-              <a:t>15</a:t>
+              <a:t>14</a:t>
             </a:fld>
             <a:endParaRPr lang="en-US"/>
           </a:p>
@@ -700,7 +690,7 @@
     </p:spTree>
     <p:extLst>
       <p:ext uri="{BB962C8B-B14F-4D97-AF65-F5344CB8AC3E}">
-        <p14:creationId xmlns:p14="http://schemas.microsoft.com/office/powerpoint/2010/main" val="4137061440"/>
+        <p14:creationId xmlns:p14="http://schemas.microsoft.com/office/powerpoint/2010/main" val="1675685290"/>
       </p:ext>
     </p:extLst>
   </p:cSld>
@@ -756,28 +746,16 @@
           <a:p>
             <a:r>
               <a:rPr lang="en-US" dirty="0"/>
-              <a:t>MFI2005: data input program for </a:t>
+              <a:t>“simulation type” refers to: “</a:t>
             </a:r>
             <a:r>
               <a:rPr lang="en-US" dirty="0" err="1"/>
-              <a:t>modflow</a:t>
-            </a:r>
-            <a:endParaRPr lang="en-US" dirty="0"/>
-          </a:p>
-          <a:p>
+              <a:t>pathline</a:t>
+            </a:r>
             <a:r>
               <a:rPr lang="en-US" dirty="0"/>
-              <a:t>MPSIM: Not sure what this is?</a:t>
-            </a:r>
-          </a:p>
-          <a:p>
-            <a:r>
-              <a:rPr lang="en-US" dirty="0"/>
-              <a:t>MODPATH output examiner: MODPATH 6</a:t>
-            </a:r>
-          </a:p>
-          <a:p>
-            <a:endParaRPr lang="en-US" dirty="0"/>
+              <a:t>”, “endpoint”, “timeseries”, combined.</a:t>
+            </a:r>
           </a:p>
         </p:txBody>
       </p:sp>
@@ -798,7 +776,7 @@
           <a:p>
             <a:fld id="{250FA1EE-1356-4992-842D-52AFC42108E3}" type="slidenum">
               <a:rPr lang="en-US" smtClean="0"/>
-              <a:t>17</a:t>
+              <a:t>15</a:t>
             </a:fld>
             <a:endParaRPr lang="en-US"/>
           </a:p>
@@ -807,7 +785,7 @@
     </p:spTree>
     <p:extLst>
       <p:ext uri="{BB962C8B-B14F-4D97-AF65-F5344CB8AC3E}">
-        <p14:creationId xmlns:p14="http://schemas.microsoft.com/office/powerpoint/2010/main" val="3318715884"/>
+        <p14:creationId xmlns:p14="http://schemas.microsoft.com/office/powerpoint/2010/main" val="4137061440"/>
       </p:ext>
     </p:extLst>
   </p:cSld>
@@ -862,13 +840,29 @@
           <a:lstStyle/>
           <a:p>
             <a:r>
+              <a:rPr lang="en-US" dirty="0"/>
+              <a:t>MFI2005: data input program for </a:t>
+            </a:r>
+            <a:r>
               <a:rPr lang="en-US" dirty="0" err="1"/>
-              <a:t>ModelMuse</a:t>
-            </a:r>
+              <a:t>modflow</a:t>
+            </a:r>
+            <a:endParaRPr lang="en-US" dirty="0"/>
+          </a:p>
+          <a:p>
             <a:r>
               <a:rPr lang="en-US" dirty="0"/>
-              <a:t>!</a:t>
-            </a:r>
+              <a:t>MPSIM: Not sure what this is?</a:t>
+            </a:r>
+          </a:p>
+          <a:p>
+            <a:r>
+              <a:rPr lang="en-US" dirty="0"/>
+              <a:t>MODPATH output examiner: MODPATH 6</a:t>
+            </a:r>
+          </a:p>
+          <a:p>
+            <a:endParaRPr lang="en-US" dirty="0"/>
           </a:p>
         </p:txBody>
       </p:sp>
@@ -889,7 +883,7 @@
           <a:p>
             <a:fld id="{250FA1EE-1356-4992-842D-52AFC42108E3}" type="slidenum">
               <a:rPr lang="en-US" smtClean="0"/>
-              <a:t>18</a:t>
+              <a:t>17</a:t>
             </a:fld>
             <a:endParaRPr lang="en-US"/>
           </a:p>
@@ -898,7 +892,7 @@
     </p:spTree>
     <p:extLst>
       <p:ext uri="{BB962C8B-B14F-4D97-AF65-F5344CB8AC3E}">
-        <p14:creationId xmlns:p14="http://schemas.microsoft.com/office/powerpoint/2010/main" val="4039527789"/>
+        <p14:creationId xmlns:p14="http://schemas.microsoft.com/office/powerpoint/2010/main" val="3318715884"/>
       </p:ext>
     </p:extLst>
   </p:cSld>
@@ -952,7 +946,14 @@
           <a:bodyPr/>
           <a:lstStyle/>
           <a:p>
-            <a:endParaRPr lang="en-US" dirty="0"/>
+            <a:r>
+              <a:rPr lang="en-US" dirty="0" err="1"/>
+              <a:t>ModelMuse</a:t>
+            </a:r>
+            <a:r>
+              <a:rPr lang="en-US" dirty="0"/>
+              <a:t>!</a:t>
+            </a:r>
           </a:p>
         </p:txBody>
       </p:sp>
@@ -973,7 +974,182 @@
           <a:p>
             <a:fld id="{250FA1EE-1356-4992-842D-52AFC42108E3}" type="slidenum">
               <a:rPr lang="en-US" smtClean="0"/>
+              <a:t>18</a:t>
+            </a:fld>
+            <a:endParaRPr lang="en-US"/>
+          </a:p>
+        </p:txBody>
+      </p:sp>
+    </p:spTree>
+    <p:extLst>
+      <p:ext uri="{BB962C8B-B14F-4D97-AF65-F5344CB8AC3E}">
+        <p14:creationId xmlns:p14="http://schemas.microsoft.com/office/powerpoint/2010/main" val="4039527789"/>
+      </p:ext>
+    </p:extLst>
+  </p:cSld>
+  <p:clrMapOvr>
+    <a:masterClrMapping/>
+  </p:clrMapOvr>
+</p:notes>
+</file>
+
+<file path=ppt/notesSlides/notesSlide6.xml><?xml version="1.0" encoding="utf-8"?>
+<p:notes xmlns:a="http://schemas.openxmlformats.org/drawingml/2006/main" xmlns:r="http://schemas.openxmlformats.org/officeDocument/2006/relationships" xmlns:p="http://schemas.openxmlformats.org/presentationml/2006/main">
+  <p:cSld>
+    <p:spTree>
+      <p:nvGrpSpPr>
+        <p:cNvPr id="1" name=""/>
+        <p:cNvGrpSpPr/>
+        <p:nvPr/>
+      </p:nvGrpSpPr>
+      <p:grpSpPr>
+        <a:xfrm>
+          <a:off x="0" y="0"/>
+          <a:ext cx="0" cy="0"/>
+          <a:chOff x="0" y="0"/>
+          <a:chExt cx="0" cy="0"/>
+        </a:xfrm>
+      </p:grpSpPr>
+      <p:sp>
+        <p:nvSpPr>
+          <p:cNvPr id="2" name="Slide Image Placeholder 1"/>
+          <p:cNvSpPr>
+            <a:spLocks noGrp="1" noRot="1" noChangeAspect="1"/>
+          </p:cNvSpPr>
+          <p:nvPr>
+            <p:ph type="sldImg"/>
+          </p:nvPr>
+        </p:nvSpPr>
+        <p:spPr/>
+      </p:sp>
+      <p:sp>
+        <p:nvSpPr>
+          <p:cNvPr id="3" name="Notes Placeholder 2"/>
+          <p:cNvSpPr>
+            <a:spLocks noGrp="1"/>
+          </p:cNvSpPr>
+          <p:nvPr>
+            <p:ph type="body" idx="1"/>
+          </p:nvPr>
+        </p:nvSpPr>
+        <p:spPr/>
+        <p:txBody>
+          <a:bodyPr/>
+          <a:lstStyle/>
+          <a:p>
+            <a:r>
+              <a:rPr lang="en-US" dirty="0" err="1"/>
+              <a:t>ModelMuse</a:t>
+            </a:r>
+            <a:r>
+              <a:rPr lang="en-US" dirty="0"/>
+              <a:t>!</a:t>
+            </a:r>
+          </a:p>
+        </p:txBody>
+      </p:sp>
+      <p:sp>
+        <p:nvSpPr>
+          <p:cNvPr id="4" name="Slide Number Placeholder 3"/>
+          <p:cNvSpPr>
+            <a:spLocks noGrp="1"/>
+          </p:cNvSpPr>
+          <p:nvPr>
+            <p:ph type="sldNum" sz="quarter" idx="5"/>
+          </p:nvPr>
+        </p:nvSpPr>
+        <p:spPr/>
+        <p:txBody>
+          <a:bodyPr/>
+          <a:lstStyle/>
+          <a:p>
+            <a:fld id="{250FA1EE-1356-4992-842D-52AFC42108E3}" type="slidenum">
+              <a:rPr lang="en-US" smtClean="0"/>
               <a:t>19</a:t>
+            </a:fld>
+            <a:endParaRPr lang="en-US"/>
+          </a:p>
+        </p:txBody>
+      </p:sp>
+    </p:spTree>
+    <p:extLst>
+      <p:ext uri="{BB962C8B-B14F-4D97-AF65-F5344CB8AC3E}">
+        <p14:creationId xmlns:p14="http://schemas.microsoft.com/office/powerpoint/2010/main" val="469068737"/>
+      </p:ext>
+    </p:extLst>
+  </p:cSld>
+  <p:clrMapOvr>
+    <a:masterClrMapping/>
+  </p:clrMapOvr>
+</p:notes>
+</file>
+
+<file path=ppt/notesSlides/notesSlide7.xml><?xml version="1.0" encoding="utf-8"?>
+<p:notes xmlns:a="http://schemas.openxmlformats.org/drawingml/2006/main" xmlns:r="http://schemas.openxmlformats.org/officeDocument/2006/relationships" xmlns:p="http://schemas.openxmlformats.org/presentationml/2006/main">
+  <p:cSld>
+    <p:spTree>
+      <p:nvGrpSpPr>
+        <p:cNvPr id="1" name=""/>
+        <p:cNvGrpSpPr/>
+        <p:nvPr/>
+      </p:nvGrpSpPr>
+      <p:grpSpPr>
+        <a:xfrm>
+          <a:off x="0" y="0"/>
+          <a:ext cx="0" cy="0"/>
+          <a:chOff x="0" y="0"/>
+          <a:chExt cx="0" cy="0"/>
+        </a:xfrm>
+      </p:grpSpPr>
+      <p:sp>
+        <p:nvSpPr>
+          <p:cNvPr id="2" name="Slide Image Placeholder 1"/>
+          <p:cNvSpPr>
+            <a:spLocks noGrp="1" noRot="1" noChangeAspect="1"/>
+          </p:cNvSpPr>
+          <p:nvPr>
+            <p:ph type="sldImg"/>
+          </p:nvPr>
+        </p:nvSpPr>
+        <p:spPr/>
+      </p:sp>
+      <p:sp>
+        <p:nvSpPr>
+          <p:cNvPr id="3" name="Notes Placeholder 2"/>
+          <p:cNvSpPr>
+            <a:spLocks noGrp="1"/>
+          </p:cNvSpPr>
+          <p:nvPr>
+            <p:ph type="body" idx="1"/>
+          </p:nvPr>
+        </p:nvSpPr>
+        <p:spPr/>
+        <p:txBody>
+          <a:bodyPr/>
+          <a:lstStyle/>
+          <a:p>
+            <a:endParaRPr lang="en-US" dirty="0"/>
+          </a:p>
+        </p:txBody>
+      </p:sp>
+      <p:sp>
+        <p:nvSpPr>
+          <p:cNvPr id="4" name="Slide Number Placeholder 3"/>
+          <p:cNvSpPr>
+            <a:spLocks noGrp="1"/>
+          </p:cNvSpPr>
+          <p:nvPr>
+            <p:ph type="sldNum" sz="quarter" idx="5"/>
+          </p:nvPr>
+        </p:nvSpPr>
+        <p:spPr/>
+        <p:txBody>
+          <a:bodyPr/>
+          <a:lstStyle/>
+          <a:p>
+            <a:fld id="{250FA1EE-1356-4992-842D-52AFC42108E3}" type="slidenum">
+              <a:rPr lang="en-US" smtClean="0"/>
+              <a:t>20</a:t>
             </a:fld>
             <a:endParaRPr lang="en-US"/>
           </a:p>
@@ -1187,7 +1363,7 @@
               <a:pPr>
                 <a:defRPr/>
               </a:pPr>
-              <a:t>1/5/2023</a:t>
+              <a:t>1/13/2023</a:t>
             </a:fld>
             <a:endParaRPr lang="en-US"/>
           </a:p>
@@ -1395,7 +1571,7 @@
               <a:pPr>
                 <a:defRPr/>
               </a:pPr>
-              <a:t>1/5/2023</a:t>
+              <a:t>1/13/2023</a:t>
             </a:fld>
             <a:endParaRPr lang="en-US"/>
           </a:p>
@@ -1613,7 +1789,7 @@
               <a:pPr>
                 <a:defRPr/>
               </a:pPr>
-              <a:t>1/5/2023</a:t>
+              <a:t>1/13/2023</a:t>
             </a:fld>
             <a:endParaRPr lang="en-US"/>
           </a:p>
@@ -1821,7 +1997,7 @@
               <a:pPr>
                 <a:defRPr/>
               </a:pPr>
-              <a:t>1/5/2023</a:t>
+              <a:t>1/13/2023</a:t>
             </a:fld>
             <a:endParaRPr lang="en-US"/>
           </a:p>
@@ -2106,7 +2282,7 @@
               <a:pPr>
                 <a:defRPr/>
               </a:pPr>
-              <a:t>1/5/2023</a:t>
+              <a:t>1/13/2023</a:t>
             </a:fld>
             <a:endParaRPr lang="en-US"/>
           </a:p>
@@ -2431,7 +2607,7 @@
               <a:pPr>
                 <a:defRPr/>
               </a:pPr>
-              <a:t>1/5/2023</a:t>
+              <a:t>1/13/2023</a:t>
             </a:fld>
             <a:endParaRPr lang="en-US"/>
           </a:p>
@@ -2890,7 +3066,7 @@
               <a:pPr>
                 <a:defRPr/>
               </a:pPr>
-              <a:t>1/5/2023</a:t>
+              <a:t>1/13/2023</a:t>
             </a:fld>
             <a:endParaRPr lang="en-US"/>
           </a:p>
@@ -3047,7 +3223,7 @@
               <a:pPr>
                 <a:defRPr/>
               </a:pPr>
-              <a:t>1/5/2023</a:t>
+              <a:t>1/13/2023</a:t>
             </a:fld>
             <a:endParaRPr lang="en-US"/>
           </a:p>
@@ -3182,7 +3358,7 @@
               <a:pPr>
                 <a:defRPr/>
               </a:pPr>
-              <a:t>1/5/2023</a:t>
+              <a:t>1/13/2023</a:t>
             </a:fld>
             <a:endParaRPr lang="en-US"/>
           </a:p>
@@ -3497,7 +3673,7 @@
               <a:pPr>
                 <a:defRPr/>
               </a:pPr>
-              <a:t>1/5/2023</a:t>
+              <a:t>1/13/2023</a:t>
             </a:fld>
             <a:endParaRPr lang="en-US"/>
           </a:p>
@@ -3792,7 +3968,7 @@
               <a:pPr>
                 <a:defRPr/>
               </a:pPr>
-              <a:t>1/5/2023</a:t>
+              <a:t>1/13/2023</a:t>
             </a:fld>
             <a:endParaRPr lang="en-US"/>
           </a:p>
@@ -4113,7 +4289,7 @@
               <a:pPr>
                 <a:defRPr/>
               </a:pPr>
-              <a:t>1/5/2023</a:t>
+              <a:t>1/13/2023</a:t>
             </a:fld>
             <a:endParaRPr lang="en-US"/>
           </a:p>
@@ -4826,7 +5002,7 @@
           <p:nvPr/>
         </p:nvPicPr>
         <p:blipFill>
-          <a:blip r:embed="rId2"/>
+          <a:blip r:embed="rId3"/>
           <a:stretch>
             <a:fillRect/>
           </a:stretch>
@@ -4856,7 +5032,7 @@
           <p:nvPr/>
         </p:nvPicPr>
         <p:blipFill>
-          <a:blip r:embed="rId3">
+          <a:blip r:embed="rId4">
             <a:extLst>
               <a:ext uri="{28A0092B-C50C-407E-A947-70E740481C1C}">
                 <a14:useLocalDpi xmlns:a14="http://schemas.microsoft.com/office/drawing/2010/main" val="0"/>
@@ -4926,7 +5102,7 @@
           <p:nvPr/>
         </p:nvPicPr>
         <p:blipFill>
-          <a:blip r:embed="rId4">
+          <a:blip r:embed="rId5">
             <a:extLst>
               <a:ext uri="{28A0092B-C50C-407E-A947-70E740481C1C}">
                 <a14:useLocalDpi xmlns:a14="http://schemas.microsoft.com/office/drawing/2010/main" val="0"/>
@@ -4996,7 +5172,7 @@
           <p:nvPr/>
         </p:nvPicPr>
         <p:blipFill>
-          <a:blip r:embed="rId5">
+          <a:blip r:embed="rId6">
             <a:extLst>
               <a:ext uri="{28A0092B-C50C-407E-A947-70E740481C1C}">
                 <a14:useLocalDpi xmlns:a14="http://schemas.microsoft.com/office/drawing/2010/main" val="0"/>
@@ -8307,42 +8483,6 @@
           <a:chExt cx="0" cy="0"/>
         </a:xfrm>
       </p:grpSpPr>
-      <p:pic>
-        <p:nvPicPr>
-          <p:cNvPr id="13" name="Picture 12" descr="Chart, radar chart&#10;&#10;Description automatically generated">
-            <a:extLst>
-              <a:ext uri="{FF2B5EF4-FFF2-40B4-BE49-F238E27FC236}">
-                <a16:creationId xmlns:a16="http://schemas.microsoft.com/office/drawing/2014/main" id="{743E5613-65E2-44F1-8DB5-BF881102DA5F}"/>
-              </a:ext>
-            </a:extLst>
-          </p:cNvPr>
-          <p:cNvPicPr>
-            <a:picLocks noChangeAspect="1"/>
-          </p:cNvPicPr>
-          <p:nvPr/>
-        </p:nvPicPr>
-        <p:blipFill>
-          <a:blip r:embed="rId3">
-            <a:extLst>
-              <a:ext uri="{28A0092B-C50C-407E-A947-70E740481C1C}">
-                <a14:useLocalDpi xmlns:a14="http://schemas.microsoft.com/office/drawing/2010/main" val="0"/>
-              </a:ext>
-            </a:extLst>
-          </a:blip>
-          <a:stretch>
-            <a:fillRect/>
-          </a:stretch>
-        </p:blipFill>
-        <p:spPr>
-          <a:xfrm>
-            <a:off x="5048058" y="990977"/>
-            <a:ext cx="3547239" cy="4876046"/>
-          </a:xfrm>
-          <a:prstGeom prst="rect">
-            <a:avLst/>
-          </a:prstGeom>
-        </p:spPr>
-      </p:pic>
       <p:sp>
         <p:nvSpPr>
           <p:cNvPr id="18438" name="TextBox 7">
@@ -8525,7 +8665,7 @@
         </p:nvSpPr>
         <p:spPr bwMode="auto">
           <a:xfrm>
-            <a:off x="342900" y="1079500"/>
+            <a:off x="1080271" y="1079500"/>
             <a:ext cx="2814681" cy="369332"/>
           </a:xfrm>
           <a:prstGeom prst="rect">
@@ -8685,6 +8825,42 @@
             <a:extLst>
               <a:ext uri="{FF2B5EF4-FFF2-40B4-BE49-F238E27FC236}">
                 <a16:creationId xmlns:a16="http://schemas.microsoft.com/office/drawing/2014/main" id="{13CCD8E2-6D99-4928-ABC8-18BE70709D72}"/>
+              </a:ext>
+            </a:extLst>
+          </p:cNvPr>
+          <p:cNvPicPr>
+            <a:picLocks noChangeAspect="1"/>
+          </p:cNvPicPr>
+          <p:nvPr/>
+        </p:nvPicPr>
+        <p:blipFill>
+          <a:blip r:embed="rId3">
+            <a:extLst>
+              <a:ext uri="{28A0092B-C50C-407E-A947-70E740481C1C}">
+                <a14:useLocalDpi xmlns:a14="http://schemas.microsoft.com/office/drawing/2010/main" val="0"/>
+              </a:ext>
+            </a:extLst>
+          </a:blip>
+          <a:stretch>
+            <a:fillRect/>
+          </a:stretch>
+        </p:blipFill>
+        <p:spPr>
+          <a:xfrm>
+            <a:off x="76200" y="1551219"/>
+            <a:ext cx="4643440" cy="3199368"/>
+          </a:xfrm>
+          <a:prstGeom prst="rect">
+            <a:avLst/>
+          </a:prstGeom>
+        </p:spPr>
+      </p:pic>
+      <p:pic>
+        <p:nvPicPr>
+          <p:cNvPr id="5" name="Picture 4">
+            <a:extLst>
+              <a:ext uri="{FF2B5EF4-FFF2-40B4-BE49-F238E27FC236}">
+                <a16:creationId xmlns:a16="http://schemas.microsoft.com/office/drawing/2014/main" id="{3644E1E4-F528-46AD-9F11-0073E872963D}"/>
               </a:ext>
             </a:extLst>
           </p:cNvPr>
@@ -8707,217 +8883,14 @@
         </p:blipFill>
         <p:spPr>
           <a:xfrm>
-            <a:off x="228600" y="1448832"/>
-            <a:ext cx="3810000" cy="2625121"/>
+            <a:off x="4858299" y="990600"/>
+            <a:ext cx="3942801" cy="5715000"/>
           </a:xfrm>
           <a:prstGeom prst="rect">
             <a:avLst/>
           </a:prstGeom>
         </p:spPr>
       </p:pic>
-      <p:pic>
-        <p:nvPicPr>
-          <p:cNvPr id="9" name="Picture 8" descr="A picture containing background pattern&#10;&#10;Description automatically generated">
-            <a:extLst>
-              <a:ext uri="{FF2B5EF4-FFF2-40B4-BE49-F238E27FC236}">
-                <a16:creationId xmlns:a16="http://schemas.microsoft.com/office/drawing/2014/main" id="{528F3AA4-290C-4044-A255-E5AD94B0492A}"/>
-              </a:ext>
-            </a:extLst>
-          </p:cNvPr>
-          <p:cNvPicPr>
-            <a:picLocks noChangeAspect="1"/>
-          </p:cNvPicPr>
-          <p:nvPr/>
-        </p:nvPicPr>
-        <p:blipFill>
-          <a:blip r:embed="rId5">
-            <a:extLst>
-              <a:ext uri="{28A0092B-C50C-407E-A947-70E740481C1C}">
-                <a14:useLocalDpi xmlns:a14="http://schemas.microsoft.com/office/drawing/2010/main" val="0"/>
-              </a:ext>
-            </a:extLst>
-          </a:blip>
-          <a:stretch>
-            <a:fillRect/>
-          </a:stretch>
-        </p:blipFill>
-        <p:spPr>
-          <a:xfrm>
-            <a:off x="2121720" y="2869684"/>
-            <a:ext cx="2510605" cy="3493016"/>
-          </a:xfrm>
-          <a:prstGeom prst="rect">
-            <a:avLst/>
-          </a:prstGeom>
-        </p:spPr>
-      </p:pic>
-      <p:sp>
-        <p:nvSpPr>
-          <p:cNvPr id="18" name="TextBox 8">
-            <a:extLst>
-              <a:ext uri="{FF2B5EF4-FFF2-40B4-BE49-F238E27FC236}">
-                <a16:creationId xmlns:a16="http://schemas.microsoft.com/office/drawing/2014/main" id="{D3D30205-9A8B-4FAA-B17F-0E00C59C793F}"/>
-              </a:ext>
-            </a:extLst>
-          </p:cNvPr>
-          <p:cNvSpPr txBox="1">
-            <a:spLocks noChangeArrowheads="1"/>
-          </p:cNvSpPr>
-          <p:nvPr/>
-        </p:nvSpPr>
-        <p:spPr bwMode="auto">
-          <a:xfrm>
-            <a:off x="6477000" y="710168"/>
-            <a:ext cx="689356" cy="369332"/>
-          </a:xfrm>
-          <a:prstGeom prst="rect">
-            <a:avLst/>
-          </a:prstGeom>
-          <a:noFill/>
-          <a:ln>
-            <a:noFill/>
-          </a:ln>
-          <a:extLst>
-            <a:ext uri="{909E8E84-426E-40DD-AFC4-6F175D3DCCD1}">
-              <a14:hiddenFill xmlns:a14="http://schemas.microsoft.com/office/drawing/2010/main">
-                <a:solidFill>
-                  <a:srgbClr val="FFFFFF"/>
-                </a:solidFill>
-              </a14:hiddenFill>
-            </a:ext>
-            <a:ext uri="{91240B29-F687-4F45-9708-019B960494DF}">
-              <a14:hiddenLine xmlns:a14="http://schemas.microsoft.com/office/drawing/2010/main" w="9525">
-                <a:solidFill>
-                  <a:srgbClr val="000000"/>
-                </a:solidFill>
-                <a:miter lim="800000"/>
-                <a:headEnd/>
-                <a:tailEnd/>
-              </a14:hiddenLine>
-            </a:ext>
-          </a:extLst>
-        </p:spPr>
-        <p:txBody>
-          <a:bodyPr wrap="none">
-            <a:spAutoFit/>
-          </a:bodyPr>
-          <a:lstStyle>
-            <a:lvl1pPr eaLnBrk="0" hangingPunct="0">
-              <a:defRPr>
-                <a:solidFill>
-                  <a:schemeClr val="tx1"/>
-                </a:solidFill>
-                <a:latin typeface="Calibri" panose="020F0502020204030204" pitchFamily="34" charset="0"/>
-                <a:cs typeface="Arial" panose="020B0604020202020204" pitchFamily="34" charset="0"/>
-              </a:defRPr>
-            </a:lvl1pPr>
-            <a:lvl2pPr marL="742950" indent="-285750" eaLnBrk="0" hangingPunct="0">
-              <a:defRPr>
-                <a:solidFill>
-                  <a:schemeClr val="tx1"/>
-                </a:solidFill>
-                <a:latin typeface="Calibri" panose="020F0502020204030204" pitchFamily="34" charset="0"/>
-                <a:cs typeface="Arial" panose="020B0604020202020204" pitchFamily="34" charset="0"/>
-              </a:defRPr>
-            </a:lvl2pPr>
-            <a:lvl3pPr marL="1143000" indent="-228600" eaLnBrk="0" hangingPunct="0">
-              <a:defRPr>
-                <a:solidFill>
-                  <a:schemeClr val="tx1"/>
-                </a:solidFill>
-                <a:latin typeface="Calibri" panose="020F0502020204030204" pitchFamily="34" charset="0"/>
-                <a:cs typeface="Arial" panose="020B0604020202020204" pitchFamily="34" charset="0"/>
-              </a:defRPr>
-            </a:lvl3pPr>
-            <a:lvl4pPr marL="1600200" indent="-228600" eaLnBrk="0" hangingPunct="0">
-              <a:defRPr>
-                <a:solidFill>
-                  <a:schemeClr val="tx1"/>
-                </a:solidFill>
-                <a:latin typeface="Calibri" panose="020F0502020204030204" pitchFamily="34" charset="0"/>
-                <a:cs typeface="Arial" panose="020B0604020202020204" pitchFamily="34" charset="0"/>
-              </a:defRPr>
-            </a:lvl4pPr>
-            <a:lvl5pPr marL="2057400" indent="-228600" eaLnBrk="0" hangingPunct="0">
-              <a:defRPr>
-                <a:solidFill>
-                  <a:schemeClr val="tx1"/>
-                </a:solidFill>
-                <a:latin typeface="Calibri" panose="020F0502020204030204" pitchFamily="34" charset="0"/>
-                <a:cs typeface="Arial" panose="020B0604020202020204" pitchFamily="34" charset="0"/>
-              </a:defRPr>
-            </a:lvl5pPr>
-            <a:lvl6pPr marL="2514600" indent="-228600" eaLnBrk="0" fontAlgn="base" hangingPunct="0">
-              <a:spcBef>
-                <a:spcPct val="0"/>
-              </a:spcBef>
-              <a:spcAft>
-                <a:spcPct val="0"/>
-              </a:spcAft>
-              <a:defRPr>
-                <a:solidFill>
-                  <a:schemeClr val="tx1"/>
-                </a:solidFill>
-                <a:latin typeface="Calibri" panose="020F0502020204030204" pitchFamily="34" charset="0"/>
-                <a:cs typeface="Arial" panose="020B0604020202020204" pitchFamily="34" charset="0"/>
-              </a:defRPr>
-            </a:lvl6pPr>
-            <a:lvl7pPr marL="2971800" indent="-228600" eaLnBrk="0" fontAlgn="base" hangingPunct="0">
-              <a:spcBef>
-                <a:spcPct val="0"/>
-              </a:spcBef>
-              <a:spcAft>
-                <a:spcPct val="0"/>
-              </a:spcAft>
-              <a:defRPr>
-                <a:solidFill>
-                  <a:schemeClr val="tx1"/>
-                </a:solidFill>
-                <a:latin typeface="Calibri" panose="020F0502020204030204" pitchFamily="34" charset="0"/>
-                <a:cs typeface="Arial" panose="020B0604020202020204" pitchFamily="34" charset="0"/>
-              </a:defRPr>
-            </a:lvl7pPr>
-            <a:lvl8pPr marL="3429000" indent="-228600" eaLnBrk="0" fontAlgn="base" hangingPunct="0">
-              <a:spcBef>
-                <a:spcPct val="0"/>
-              </a:spcBef>
-              <a:spcAft>
-                <a:spcPct val="0"/>
-              </a:spcAft>
-              <a:defRPr>
-                <a:solidFill>
-                  <a:schemeClr val="tx1"/>
-                </a:solidFill>
-                <a:latin typeface="Calibri" panose="020F0502020204030204" pitchFamily="34" charset="0"/>
-                <a:cs typeface="Arial" panose="020B0604020202020204" pitchFamily="34" charset="0"/>
-              </a:defRPr>
-            </a:lvl8pPr>
-            <a:lvl9pPr marL="3886200" indent="-228600" eaLnBrk="0" fontAlgn="base" hangingPunct="0">
-              <a:spcBef>
-                <a:spcPct val="0"/>
-              </a:spcBef>
-              <a:spcAft>
-                <a:spcPct val="0"/>
-              </a:spcAft>
-              <a:defRPr>
-                <a:solidFill>
-                  <a:schemeClr val="tx1"/>
-                </a:solidFill>
-                <a:latin typeface="Calibri" panose="020F0502020204030204" pitchFamily="34" charset="0"/>
-                <a:cs typeface="Arial" panose="020B0604020202020204" pitchFamily="34" charset="0"/>
-              </a:defRPr>
-            </a:lvl9pPr>
-          </a:lstStyle>
-          <a:p>
-            <a:pPr eaLnBrk="1" hangingPunct="1"/>
-            <a:r>
-              <a:rPr lang="en-US" altLang="en-US" dirty="0" err="1"/>
-              <a:t>FloPy</a:t>
-            </a:r>
-            <a:endParaRPr lang="en-US" altLang="en-US" dirty="0"/>
-          </a:p>
-        </p:txBody>
-      </p:sp>
     </p:spTree>
     <p:extLst>
       <p:ext uri="{BB962C8B-B14F-4D97-AF65-F5344CB8AC3E}">
@@ -8948,12 +8921,345 @@
           <a:chExt cx="0" cy="0"/>
         </a:xfrm>
       </p:grpSpPr>
+      <p:sp>
+        <p:nvSpPr>
+          <p:cNvPr id="18438" name="TextBox 7">
+            <a:extLst>
+              <a:ext uri="{FF2B5EF4-FFF2-40B4-BE49-F238E27FC236}">
+                <a16:creationId xmlns:a16="http://schemas.microsoft.com/office/drawing/2014/main" id="{6F4E663D-E004-134D-94A8-61DAF47E1E5E}"/>
+              </a:ext>
+            </a:extLst>
+          </p:cNvPr>
+          <p:cNvSpPr txBox="1">
+            <a:spLocks noChangeArrowheads="1"/>
+          </p:cNvSpPr>
+          <p:nvPr/>
+        </p:nvSpPr>
+        <p:spPr bwMode="auto">
+          <a:xfrm>
+            <a:off x="342900" y="495300"/>
+            <a:ext cx="4289425" cy="584200"/>
+          </a:xfrm>
+          <a:prstGeom prst="rect">
+            <a:avLst/>
+          </a:prstGeom>
+          <a:noFill/>
+          <a:ln>
+            <a:noFill/>
+          </a:ln>
+          <a:extLst>
+            <a:ext uri="{909E8E84-426E-40DD-AFC4-6F175D3DCCD1}">
+              <a14:hiddenFill xmlns:a14="http://schemas.microsoft.com/office/drawing/2010/main">
+                <a:solidFill>
+                  <a:srgbClr val="FFFFFF"/>
+                </a:solidFill>
+              </a14:hiddenFill>
+            </a:ext>
+            <a:ext uri="{91240B29-F687-4F45-9708-019B960494DF}">
+              <a14:hiddenLine xmlns:a14="http://schemas.microsoft.com/office/drawing/2010/main" w="9525">
+                <a:solidFill>
+                  <a:srgbClr val="000000"/>
+                </a:solidFill>
+                <a:miter lim="800000"/>
+                <a:headEnd/>
+                <a:tailEnd/>
+              </a14:hiddenLine>
+            </a:ext>
+          </a:extLst>
+        </p:spPr>
+        <p:txBody>
+          <a:bodyPr wrap="none">
+            <a:spAutoFit/>
+          </a:bodyPr>
+          <a:lstStyle>
+            <a:lvl1pPr eaLnBrk="0" hangingPunct="0">
+              <a:defRPr>
+                <a:solidFill>
+                  <a:schemeClr val="tx1"/>
+                </a:solidFill>
+                <a:latin typeface="Calibri" panose="020F0502020204030204" pitchFamily="34" charset="0"/>
+                <a:cs typeface="Arial" panose="020B0604020202020204" pitchFamily="34" charset="0"/>
+              </a:defRPr>
+            </a:lvl1pPr>
+            <a:lvl2pPr marL="742950" indent="-285750" eaLnBrk="0" hangingPunct="0">
+              <a:defRPr>
+                <a:solidFill>
+                  <a:schemeClr val="tx1"/>
+                </a:solidFill>
+                <a:latin typeface="Calibri" panose="020F0502020204030204" pitchFamily="34" charset="0"/>
+                <a:cs typeface="Arial" panose="020B0604020202020204" pitchFamily="34" charset="0"/>
+              </a:defRPr>
+            </a:lvl2pPr>
+            <a:lvl3pPr marL="1143000" indent="-228600" eaLnBrk="0" hangingPunct="0">
+              <a:defRPr>
+                <a:solidFill>
+                  <a:schemeClr val="tx1"/>
+                </a:solidFill>
+                <a:latin typeface="Calibri" panose="020F0502020204030204" pitchFamily="34" charset="0"/>
+                <a:cs typeface="Arial" panose="020B0604020202020204" pitchFamily="34" charset="0"/>
+              </a:defRPr>
+            </a:lvl3pPr>
+            <a:lvl4pPr marL="1600200" indent="-228600" eaLnBrk="0" hangingPunct="0">
+              <a:defRPr>
+                <a:solidFill>
+                  <a:schemeClr val="tx1"/>
+                </a:solidFill>
+                <a:latin typeface="Calibri" panose="020F0502020204030204" pitchFamily="34" charset="0"/>
+                <a:cs typeface="Arial" panose="020B0604020202020204" pitchFamily="34" charset="0"/>
+              </a:defRPr>
+            </a:lvl4pPr>
+            <a:lvl5pPr marL="2057400" indent="-228600" eaLnBrk="0" hangingPunct="0">
+              <a:defRPr>
+                <a:solidFill>
+                  <a:schemeClr val="tx1"/>
+                </a:solidFill>
+                <a:latin typeface="Calibri" panose="020F0502020204030204" pitchFamily="34" charset="0"/>
+                <a:cs typeface="Arial" panose="020B0604020202020204" pitchFamily="34" charset="0"/>
+              </a:defRPr>
+            </a:lvl5pPr>
+            <a:lvl6pPr marL="2514600" indent="-228600" eaLnBrk="0" fontAlgn="base" hangingPunct="0">
+              <a:spcBef>
+                <a:spcPct val="0"/>
+              </a:spcBef>
+              <a:spcAft>
+                <a:spcPct val="0"/>
+              </a:spcAft>
+              <a:defRPr>
+                <a:solidFill>
+                  <a:schemeClr val="tx1"/>
+                </a:solidFill>
+                <a:latin typeface="Calibri" panose="020F0502020204030204" pitchFamily="34" charset="0"/>
+                <a:cs typeface="Arial" panose="020B0604020202020204" pitchFamily="34" charset="0"/>
+              </a:defRPr>
+            </a:lvl6pPr>
+            <a:lvl7pPr marL="2971800" indent="-228600" eaLnBrk="0" fontAlgn="base" hangingPunct="0">
+              <a:spcBef>
+                <a:spcPct val="0"/>
+              </a:spcBef>
+              <a:spcAft>
+                <a:spcPct val="0"/>
+              </a:spcAft>
+              <a:defRPr>
+                <a:solidFill>
+                  <a:schemeClr val="tx1"/>
+                </a:solidFill>
+                <a:latin typeface="Calibri" panose="020F0502020204030204" pitchFamily="34" charset="0"/>
+                <a:cs typeface="Arial" panose="020B0604020202020204" pitchFamily="34" charset="0"/>
+              </a:defRPr>
+            </a:lvl7pPr>
+            <a:lvl8pPr marL="3429000" indent="-228600" eaLnBrk="0" fontAlgn="base" hangingPunct="0">
+              <a:spcBef>
+                <a:spcPct val="0"/>
+              </a:spcBef>
+              <a:spcAft>
+                <a:spcPct val="0"/>
+              </a:spcAft>
+              <a:defRPr>
+                <a:solidFill>
+                  <a:schemeClr val="tx1"/>
+                </a:solidFill>
+                <a:latin typeface="Calibri" panose="020F0502020204030204" pitchFamily="34" charset="0"/>
+                <a:cs typeface="Arial" panose="020B0604020202020204" pitchFamily="34" charset="0"/>
+              </a:defRPr>
+            </a:lvl8pPr>
+            <a:lvl9pPr marL="3886200" indent="-228600" eaLnBrk="0" fontAlgn="base" hangingPunct="0">
+              <a:spcBef>
+                <a:spcPct val="0"/>
+              </a:spcBef>
+              <a:spcAft>
+                <a:spcPct val="0"/>
+              </a:spcAft>
+              <a:defRPr>
+                <a:solidFill>
+                  <a:schemeClr val="tx1"/>
+                </a:solidFill>
+                <a:latin typeface="Calibri" panose="020F0502020204030204" pitchFamily="34" charset="0"/>
+                <a:cs typeface="Arial" panose="020B0604020202020204" pitchFamily="34" charset="0"/>
+              </a:defRPr>
+            </a:lvl9pPr>
+          </a:lstStyle>
+          <a:p>
+            <a:pPr eaLnBrk="1" hangingPunct="1"/>
+            <a:r>
+              <a:rPr lang="en-US" altLang="en-US" sz="3200" dirty="0"/>
+              <a:t>Pre- and Post-Processors</a:t>
+            </a:r>
+          </a:p>
+        </p:txBody>
+      </p:sp>
+      <p:sp>
+        <p:nvSpPr>
+          <p:cNvPr id="18" name="TextBox 8">
+            <a:extLst>
+              <a:ext uri="{FF2B5EF4-FFF2-40B4-BE49-F238E27FC236}">
+                <a16:creationId xmlns:a16="http://schemas.microsoft.com/office/drawing/2014/main" id="{D3D30205-9A8B-4FAA-B17F-0E00C59C793F}"/>
+              </a:ext>
+            </a:extLst>
+          </p:cNvPr>
+          <p:cNvSpPr txBox="1">
+            <a:spLocks noChangeArrowheads="1"/>
+          </p:cNvSpPr>
+          <p:nvPr/>
+        </p:nvSpPr>
+        <p:spPr bwMode="auto">
+          <a:xfrm>
+            <a:off x="4152900" y="1264166"/>
+            <a:ext cx="1579753" cy="461665"/>
+          </a:xfrm>
+          <a:prstGeom prst="rect">
+            <a:avLst/>
+          </a:prstGeom>
+          <a:noFill/>
+          <a:ln>
+            <a:noFill/>
+          </a:ln>
+          <a:extLst>
+            <a:ext uri="{909E8E84-426E-40DD-AFC4-6F175D3DCCD1}">
+              <a14:hiddenFill xmlns:a14="http://schemas.microsoft.com/office/drawing/2010/main">
+                <a:solidFill>
+                  <a:srgbClr val="FFFFFF"/>
+                </a:solidFill>
+              </a14:hiddenFill>
+            </a:ext>
+            <a:ext uri="{91240B29-F687-4F45-9708-019B960494DF}">
+              <a14:hiddenLine xmlns:a14="http://schemas.microsoft.com/office/drawing/2010/main" w="9525">
+                <a:solidFill>
+                  <a:srgbClr val="000000"/>
+                </a:solidFill>
+                <a:miter lim="800000"/>
+                <a:headEnd/>
+                <a:tailEnd/>
+              </a14:hiddenLine>
+            </a:ext>
+          </a:extLst>
+        </p:spPr>
+        <p:txBody>
+          <a:bodyPr wrap="square">
+            <a:spAutoFit/>
+          </a:bodyPr>
+          <a:lstStyle>
+            <a:lvl1pPr eaLnBrk="0" hangingPunct="0">
+              <a:defRPr>
+                <a:solidFill>
+                  <a:schemeClr val="tx1"/>
+                </a:solidFill>
+                <a:latin typeface="Calibri" panose="020F0502020204030204" pitchFamily="34" charset="0"/>
+                <a:cs typeface="Arial" panose="020B0604020202020204" pitchFamily="34" charset="0"/>
+              </a:defRPr>
+            </a:lvl1pPr>
+            <a:lvl2pPr marL="742950" indent="-285750" eaLnBrk="0" hangingPunct="0">
+              <a:defRPr>
+                <a:solidFill>
+                  <a:schemeClr val="tx1"/>
+                </a:solidFill>
+                <a:latin typeface="Calibri" panose="020F0502020204030204" pitchFamily="34" charset="0"/>
+                <a:cs typeface="Arial" panose="020B0604020202020204" pitchFamily="34" charset="0"/>
+              </a:defRPr>
+            </a:lvl2pPr>
+            <a:lvl3pPr marL="1143000" indent="-228600" eaLnBrk="0" hangingPunct="0">
+              <a:defRPr>
+                <a:solidFill>
+                  <a:schemeClr val="tx1"/>
+                </a:solidFill>
+                <a:latin typeface="Calibri" panose="020F0502020204030204" pitchFamily="34" charset="0"/>
+                <a:cs typeface="Arial" panose="020B0604020202020204" pitchFamily="34" charset="0"/>
+              </a:defRPr>
+            </a:lvl3pPr>
+            <a:lvl4pPr marL="1600200" indent="-228600" eaLnBrk="0" hangingPunct="0">
+              <a:defRPr>
+                <a:solidFill>
+                  <a:schemeClr val="tx1"/>
+                </a:solidFill>
+                <a:latin typeface="Calibri" panose="020F0502020204030204" pitchFamily="34" charset="0"/>
+                <a:cs typeface="Arial" panose="020B0604020202020204" pitchFamily="34" charset="0"/>
+              </a:defRPr>
+            </a:lvl4pPr>
+            <a:lvl5pPr marL="2057400" indent="-228600" eaLnBrk="0" hangingPunct="0">
+              <a:defRPr>
+                <a:solidFill>
+                  <a:schemeClr val="tx1"/>
+                </a:solidFill>
+                <a:latin typeface="Calibri" panose="020F0502020204030204" pitchFamily="34" charset="0"/>
+                <a:cs typeface="Arial" panose="020B0604020202020204" pitchFamily="34" charset="0"/>
+              </a:defRPr>
+            </a:lvl5pPr>
+            <a:lvl6pPr marL="2514600" indent="-228600" eaLnBrk="0" fontAlgn="base" hangingPunct="0">
+              <a:spcBef>
+                <a:spcPct val="0"/>
+              </a:spcBef>
+              <a:spcAft>
+                <a:spcPct val="0"/>
+              </a:spcAft>
+              <a:defRPr>
+                <a:solidFill>
+                  <a:schemeClr val="tx1"/>
+                </a:solidFill>
+                <a:latin typeface="Calibri" panose="020F0502020204030204" pitchFamily="34" charset="0"/>
+                <a:cs typeface="Arial" panose="020B0604020202020204" pitchFamily="34" charset="0"/>
+              </a:defRPr>
+            </a:lvl6pPr>
+            <a:lvl7pPr marL="2971800" indent="-228600" eaLnBrk="0" fontAlgn="base" hangingPunct="0">
+              <a:spcBef>
+                <a:spcPct val="0"/>
+              </a:spcBef>
+              <a:spcAft>
+                <a:spcPct val="0"/>
+              </a:spcAft>
+              <a:defRPr>
+                <a:solidFill>
+                  <a:schemeClr val="tx1"/>
+                </a:solidFill>
+                <a:latin typeface="Calibri" panose="020F0502020204030204" pitchFamily="34" charset="0"/>
+                <a:cs typeface="Arial" panose="020B0604020202020204" pitchFamily="34" charset="0"/>
+              </a:defRPr>
+            </a:lvl7pPr>
+            <a:lvl8pPr marL="3429000" indent="-228600" eaLnBrk="0" fontAlgn="base" hangingPunct="0">
+              <a:spcBef>
+                <a:spcPct val="0"/>
+              </a:spcBef>
+              <a:spcAft>
+                <a:spcPct val="0"/>
+              </a:spcAft>
+              <a:defRPr>
+                <a:solidFill>
+                  <a:schemeClr val="tx1"/>
+                </a:solidFill>
+                <a:latin typeface="Calibri" panose="020F0502020204030204" pitchFamily="34" charset="0"/>
+                <a:cs typeface="Arial" panose="020B0604020202020204" pitchFamily="34" charset="0"/>
+              </a:defRPr>
+            </a:lvl8pPr>
+            <a:lvl9pPr marL="3886200" indent="-228600" eaLnBrk="0" fontAlgn="base" hangingPunct="0">
+              <a:spcBef>
+                <a:spcPct val="0"/>
+              </a:spcBef>
+              <a:spcAft>
+                <a:spcPct val="0"/>
+              </a:spcAft>
+              <a:defRPr>
+                <a:solidFill>
+                  <a:schemeClr val="tx1"/>
+                </a:solidFill>
+                <a:latin typeface="Calibri" panose="020F0502020204030204" pitchFamily="34" charset="0"/>
+                <a:cs typeface="Arial" panose="020B0604020202020204" pitchFamily="34" charset="0"/>
+              </a:defRPr>
+            </a:lvl9pPr>
+          </a:lstStyle>
+          <a:p>
+            <a:pPr eaLnBrk="1" hangingPunct="1"/>
+            <a:r>
+              <a:rPr lang="en-US" altLang="en-US" sz="2400" dirty="0" err="1"/>
+              <a:t>FloPy</a:t>
+            </a:r>
+            <a:endParaRPr lang="en-US" altLang="en-US" sz="2400" dirty="0"/>
+          </a:p>
+        </p:txBody>
+      </p:sp>
       <p:pic>
         <p:nvPicPr>
-          <p:cNvPr id="19458" name="Picture 4">
+          <p:cNvPr id="3" name="Picture 2">
             <a:extLst>
               <a:ext uri="{FF2B5EF4-FFF2-40B4-BE49-F238E27FC236}">
-                <a16:creationId xmlns:a16="http://schemas.microsoft.com/office/drawing/2014/main" id="{478B33AF-5DB7-6040-B555-23308D13F793}"/>
+                <a16:creationId xmlns:a16="http://schemas.microsoft.com/office/drawing/2014/main" id="{9D96C03F-9988-491E-834F-DA86C259A3B0}"/>
               </a:ext>
             </a:extLst>
           </p:cNvPr>
@@ -8970,303 +9276,26 @@
               </a:ext>
             </a:extLst>
           </a:blip>
-          <a:srcRect/>
           <a:stretch>
             <a:fillRect/>
           </a:stretch>
         </p:blipFill>
-        <p:spPr bwMode="auto">
+        <p:spPr>
           <a:xfrm>
-            <a:off x="2209800" y="1524000"/>
-            <a:ext cx="4818063" cy="4951413"/>
+            <a:off x="29547" y="1818164"/>
+            <a:ext cx="9144000" cy="4267200"/>
           </a:xfrm>
           <a:prstGeom prst="rect">
             <a:avLst/>
           </a:prstGeom>
-          <a:noFill/>
-          <a:ln>
-            <a:noFill/>
-          </a:ln>
-          <a:extLst>
-            <a:ext uri="{909E8E84-426E-40DD-AFC4-6F175D3DCCD1}">
-              <a14:hiddenFill xmlns:a14="http://schemas.microsoft.com/office/drawing/2010/main">
-                <a:solidFill>
-                  <a:srgbClr val="FFFFFF"/>
-                </a:solidFill>
-              </a14:hiddenFill>
-            </a:ext>
-            <a:ext uri="{91240B29-F687-4F45-9708-019B960494DF}">
-              <a14:hiddenLine xmlns:a14="http://schemas.microsoft.com/office/drawing/2010/main" w="9525">
-                <a:solidFill>
-                  <a:srgbClr val="000000"/>
-                </a:solidFill>
-                <a:miter lim="800000"/>
-                <a:headEnd/>
-                <a:tailEnd/>
-              </a14:hiddenLine>
-            </a:ext>
-          </a:extLst>
         </p:spPr>
       </p:pic>
-      <p:sp>
-        <p:nvSpPr>
-          <p:cNvPr id="19459" name="TextBox 1">
-            <a:extLst>
-              <a:ext uri="{FF2B5EF4-FFF2-40B4-BE49-F238E27FC236}">
-                <a16:creationId xmlns:a16="http://schemas.microsoft.com/office/drawing/2014/main" id="{D56FD110-9F55-A64B-BFA6-6EC61301EAF4}"/>
-              </a:ext>
-            </a:extLst>
-          </p:cNvPr>
-          <p:cNvSpPr txBox="1">
-            <a:spLocks noChangeArrowheads="1"/>
-          </p:cNvSpPr>
-          <p:nvPr/>
-        </p:nvSpPr>
-        <p:spPr bwMode="auto">
-          <a:xfrm>
-            <a:off x="1143000" y="609600"/>
-            <a:ext cx="7354888" cy="646113"/>
-          </a:xfrm>
-          <a:prstGeom prst="rect">
-            <a:avLst/>
-          </a:prstGeom>
-          <a:noFill/>
-          <a:ln>
-            <a:noFill/>
-          </a:ln>
-          <a:extLst>
-            <a:ext uri="{909E8E84-426E-40DD-AFC4-6F175D3DCCD1}">
-              <a14:hiddenFill xmlns:a14="http://schemas.microsoft.com/office/drawing/2010/main">
-                <a:solidFill>
-                  <a:srgbClr val="FFFFFF"/>
-                </a:solidFill>
-              </a14:hiddenFill>
-            </a:ext>
-            <a:ext uri="{91240B29-F687-4F45-9708-019B960494DF}">
-              <a14:hiddenLine xmlns:a14="http://schemas.microsoft.com/office/drawing/2010/main" w="9525">
-                <a:solidFill>
-                  <a:srgbClr val="000000"/>
-                </a:solidFill>
-                <a:miter lim="800000"/>
-                <a:headEnd/>
-                <a:tailEnd/>
-              </a14:hiddenLine>
-            </a:ext>
-          </a:extLst>
-        </p:spPr>
-        <p:txBody>
-          <a:bodyPr wrap="none">
-            <a:spAutoFit/>
-          </a:bodyPr>
-          <a:lstStyle>
-            <a:lvl1pPr eaLnBrk="0" hangingPunct="0">
-              <a:defRPr>
-                <a:solidFill>
-                  <a:schemeClr val="tx1"/>
-                </a:solidFill>
-                <a:latin typeface="Calibri" panose="020F0502020204030204" pitchFamily="34" charset="0"/>
-                <a:cs typeface="Arial" panose="020B0604020202020204" pitchFamily="34" charset="0"/>
-              </a:defRPr>
-            </a:lvl1pPr>
-            <a:lvl2pPr marL="742950" indent="-285750" eaLnBrk="0" hangingPunct="0">
-              <a:defRPr>
-                <a:solidFill>
-                  <a:schemeClr val="tx1"/>
-                </a:solidFill>
-                <a:latin typeface="Calibri" panose="020F0502020204030204" pitchFamily="34" charset="0"/>
-                <a:cs typeface="Arial" panose="020B0604020202020204" pitchFamily="34" charset="0"/>
-              </a:defRPr>
-            </a:lvl2pPr>
-            <a:lvl3pPr marL="1143000" indent="-228600" eaLnBrk="0" hangingPunct="0">
-              <a:defRPr>
-                <a:solidFill>
-                  <a:schemeClr val="tx1"/>
-                </a:solidFill>
-                <a:latin typeface="Calibri" panose="020F0502020204030204" pitchFamily="34" charset="0"/>
-                <a:cs typeface="Arial" panose="020B0604020202020204" pitchFamily="34" charset="0"/>
-              </a:defRPr>
-            </a:lvl3pPr>
-            <a:lvl4pPr marL="1600200" indent="-228600" eaLnBrk="0" hangingPunct="0">
-              <a:defRPr>
-                <a:solidFill>
-                  <a:schemeClr val="tx1"/>
-                </a:solidFill>
-                <a:latin typeface="Calibri" panose="020F0502020204030204" pitchFamily="34" charset="0"/>
-                <a:cs typeface="Arial" panose="020B0604020202020204" pitchFamily="34" charset="0"/>
-              </a:defRPr>
-            </a:lvl4pPr>
-            <a:lvl5pPr marL="2057400" indent="-228600" eaLnBrk="0" hangingPunct="0">
-              <a:defRPr>
-                <a:solidFill>
-                  <a:schemeClr val="tx1"/>
-                </a:solidFill>
-                <a:latin typeface="Calibri" panose="020F0502020204030204" pitchFamily="34" charset="0"/>
-                <a:cs typeface="Arial" panose="020B0604020202020204" pitchFamily="34" charset="0"/>
-              </a:defRPr>
-            </a:lvl5pPr>
-            <a:lvl6pPr marL="2514600" indent="-228600" eaLnBrk="0" fontAlgn="base" hangingPunct="0">
-              <a:spcBef>
-                <a:spcPct val="0"/>
-              </a:spcBef>
-              <a:spcAft>
-                <a:spcPct val="0"/>
-              </a:spcAft>
-              <a:defRPr>
-                <a:solidFill>
-                  <a:schemeClr val="tx1"/>
-                </a:solidFill>
-                <a:latin typeface="Calibri" panose="020F0502020204030204" pitchFamily="34" charset="0"/>
-                <a:cs typeface="Arial" panose="020B0604020202020204" pitchFamily="34" charset="0"/>
-              </a:defRPr>
-            </a:lvl6pPr>
-            <a:lvl7pPr marL="2971800" indent="-228600" eaLnBrk="0" fontAlgn="base" hangingPunct="0">
-              <a:spcBef>
-                <a:spcPct val="0"/>
-              </a:spcBef>
-              <a:spcAft>
-                <a:spcPct val="0"/>
-              </a:spcAft>
-              <a:defRPr>
-                <a:solidFill>
-                  <a:schemeClr val="tx1"/>
-                </a:solidFill>
-                <a:latin typeface="Calibri" panose="020F0502020204030204" pitchFamily="34" charset="0"/>
-                <a:cs typeface="Arial" panose="020B0604020202020204" pitchFamily="34" charset="0"/>
-              </a:defRPr>
-            </a:lvl7pPr>
-            <a:lvl8pPr marL="3429000" indent="-228600" eaLnBrk="0" fontAlgn="base" hangingPunct="0">
-              <a:spcBef>
-                <a:spcPct val="0"/>
-              </a:spcBef>
-              <a:spcAft>
-                <a:spcPct val="0"/>
-              </a:spcAft>
-              <a:defRPr>
-                <a:solidFill>
-                  <a:schemeClr val="tx1"/>
-                </a:solidFill>
-                <a:latin typeface="Calibri" panose="020F0502020204030204" pitchFamily="34" charset="0"/>
-                <a:cs typeface="Arial" panose="020B0604020202020204" pitchFamily="34" charset="0"/>
-              </a:defRPr>
-            </a:lvl8pPr>
-            <a:lvl9pPr marL="3886200" indent="-228600" eaLnBrk="0" fontAlgn="base" hangingPunct="0">
-              <a:spcBef>
-                <a:spcPct val="0"/>
-              </a:spcBef>
-              <a:spcAft>
-                <a:spcPct val="0"/>
-              </a:spcAft>
-              <a:defRPr>
-                <a:solidFill>
-                  <a:schemeClr val="tx1"/>
-                </a:solidFill>
-                <a:latin typeface="Calibri" panose="020F0502020204030204" pitchFamily="34" charset="0"/>
-                <a:cs typeface="Arial" panose="020B0604020202020204" pitchFamily="34" charset="0"/>
-              </a:defRPr>
-            </a:lvl9pPr>
-          </a:lstStyle>
-          <a:p>
-            <a:pPr eaLnBrk="1" hangingPunct="1"/>
-            <a:r>
-              <a:rPr lang="en-US" altLang="en-US" sz="3600"/>
-              <a:t>Using MODPATH With Deformed Grids</a:t>
-            </a:r>
-          </a:p>
-        </p:txBody>
-      </p:sp>
-      <p:sp>
-        <p:nvSpPr>
-          <p:cNvPr id="2" name="Oval 1">
-            <a:extLst>
-              <a:ext uri="{FF2B5EF4-FFF2-40B4-BE49-F238E27FC236}">
-                <a16:creationId xmlns:a16="http://schemas.microsoft.com/office/drawing/2014/main" id="{08BE48F3-2AC3-40A3-9852-EA14DF2C7A80}"/>
-              </a:ext>
-            </a:extLst>
-          </p:cNvPr>
-          <p:cNvSpPr/>
-          <p:nvPr/>
-        </p:nvSpPr>
-        <p:spPr>
-          <a:xfrm>
-            <a:off x="2781300" y="4406900"/>
-            <a:ext cx="76200" cy="76200"/>
-          </a:xfrm>
-          <a:prstGeom prst="ellipse">
-            <a:avLst/>
-          </a:prstGeom>
-        </p:spPr>
-        <p:style>
-          <a:lnRef idx="2">
-            <a:schemeClr val="accent1">
-              <a:shade val="50000"/>
-            </a:schemeClr>
-          </a:lnRef>
-          <a:fillRef idx="1">
-            <a:schemeClr val="accent1"/>
-          </a:fillRef>
-          <a:effectRef idx="0">
-            <a:schemeClr val="accent1"/>
-          </a:effectRef>
-          <a:fontRef idx="minor">
-            <a:schemeClr val="lt1"/>
-          </a:fontRef>
-        </p:style>
-        <p:txBody>
-          <a:bodyPr rtlCol="0" anchor="ctr"/>
-          <a:lstStyle/>
-          <a:p>
-            <a:pPr algn="ctr"/>
-            <a:endParaRPr lang="en-US"/>
-          </a:p>
-        </p:txBody>
-      </p:sp>
-      <p:sp>
-        <p:nvSpPr>
-          <p:cNvPr id="7" name="Oval 6">
-            <a:extLst>
-              <a:ext uri="{FF2B5EF4-FFF2-40B4-BE49-F238E27FC236}">
-                <a16:creationId xmlns:a16="http://schemas.microsoft.com/office/drawing/2014/main" id="{A5588FBB-AC4F-49BB-B378-AD5B915D70FB}"/>
-              </a:ext>
-            </a:extLst>
-          </p:cNvPr>
-          <p:cNvSpPr/>
-          <p:nvPr/>
-        </p:nvSpPr>
-        <p:spPr>
-          <a:xfrm>
-            <a:off x="2857500" y="4495800"/>
-            <a:ext cx="76200" cy="76200"/>
-          </a:xfrm>
-          <a:prstGeom prst="ellipse">
-            <a:avLst/>
-          </a:prstGeom>
-        </p:spPr>
-        <p:style>
-          <a:lnRef idx="2">
-            <a:schemeClr val="accent1">
-              <a:shade val="50000"/>
-            </a:schemeClr>
-          </a:lnRef>
-          <a:fillRef idx="1">
-            <a:schemeClr val="accent1"/>
-          </a:fillRef>
-          <a:effectRef idx="0">
-            <a:schemeClr val="accent1"/>
-          </a:effectRef>
-          <a:fontRef idx="minor">
-            <a:schemeClr val="lt1"/>
-          </a:fontRef>
-        </p:style>
-        <p:txBody>
-          <a:bodyPr rtlCol="0" anchor="ctr"/>
-          <a:lstStyle/>
-          <a:p>
-            <a:pPr algn="ctr"/>
-            <a:endParaRPr lang="en-US"/>
-          </a:p>
-        </p:txBody>
-      </p:sp>
     </p:spTree>
+    <p:extLst>
+      <p:ext uri="{BB962C8B-B14F-4D97-AF65-F5344CB8AC3E}">
+        <p14:creationId xmlns:p14="http://schemas.microsoft.com/office/powerpoint/2010/main" val="2890273169"/>
+      </p:ext>
+    </p:extLst>
   </p:cSld>
   <p:clrMapOvr>
     <a:masterClrMapping/>
@@ -9751,6 +9780,349 @@
               </a:rPr>
               <a:t>budget file.</a:t>
             </a:r>
+          </a:p>
+        </p:txBody>
+      </p:sp>
+    </p:spTree>
+  </p:cSld>
+  <p:clrMapOvr>
+    <a:masterClrMapping/>
+  </p:clrMapOvr>
+</p:sld>
+</file>
+
+<file path=ppt/slides/slide20.xml><?xml version="1.0" encoding="utf-8"?>
+<p:sld xmlns:a="http://schemas.openxmlformats.org/drawingml/2006/main" xmlns:r="http://schemas.openxmlformats.org/officeDocument/2006/relationships" xmlns:p="http://schemas.openxmlformats.org/presentationml/2006/main">
+  <p:cSld>
+    <p:spTree>
+      <p:nvGrpSpPr>
+        <p:cNvPr id="1" name=""/>
+        <p:cNvGrpSpPr/>
+        <p:nvPr/>
+      </p:nvGrpSpPr>
+      <p:grpSpPr>
+        <a:xfrm>
+          <a:off x="0" y="0"/>
+          <a:ext cx="0" cy="0"/>
+          <a:chOff x="0" y="0"/>
+          <a:chExt cx="0" cy="0"/>
+        </a:xfrm>
+      </p:grpSpPr>
+      <p:pic>
+        <p:nvPicPr>
+          <p:cNvPr id="19458" name="Picture 4">
+            <a:extLst>
+              <a:ext uri="{FF2B5EF4-FFF2-40B4-BE49-F238E27FC236}">
+                <a16:creationId xmlns:a16="http://schemas.microsoft.com/office/drawing/2014/main" id="{478B33AF-5DB7-6040-B555-23308D13F793}"/>
+              </a:ext>
+            </a:extLst>
+          </p:cNvPr>
+          <p:cNvPicPr>
+            <a:picLocks noChangeAspect="1"/>
+          </p:cNvPicPr>
+          <p:nvPr/>
+        </p:nvPicPr>
+        <p:blipFill>
+          <a:blip r:embed="rId3">
+            <a:extLst>
+              <a:ext uri="{28A0092B-C50C-407E-A947-70E740481C1C}">
+                <a14:useLocalDpi xmlns:a14="http://schemas.microsoft.com/office/drawing/2010/main" val="0"/>
+              </a:ext>
+            </a:extLst>
+          </a:blip>
+          <a:srcRect/>
+          <a:stretch>
+            <a:fillRect/>
+          </a:stretch>
+        </p:blipFill>
+        <p:spPr bwMode="auto">
+          <a:xfrm>
+            <a:off x="2209800" y="1524000"/>
+            <a:ext cx="4818063" cy="4951413"/>
+          </a:xfrm>
+          <a:prstGeom prst="rect">
+            <a:avLst/>
+          </a:prstGeom>
+          <a:noFill/>
+          <a:ln>
+            <a:noFill/>
+          </a:ln>
+          <a:extLst>
+            <a:ext uri="{909E8E84-426E-40DD-AFC4-6F175D3DCCD1}">
+              <a14:hiddenFill xmlns:a14="http://schemas.microsoft.com/office/drawing/2010/main">
+                <a:solidFill>
+                  <a:srgbClr val="FFFFFF"/>
+                </a:solidFill>
+              </a14:hiddenFill>
+            </a:ext>
+            <a:ext uri="{91240B29-F687-4F45-9708-019B960494DF}">
+              <a14:hiddenLine xmlns:a14="http://schemas.microsoft.com/office/drawing/2010/main" w="9525">
+                <a:solidFill>
+                  <a:srgbClr val="000000"/>
+                </a:solidFill>
+                <a:miter lim="800000"/>
+                <a:headEnd/>
+                <a:tailEnd/>
+              </a14:hiddenLine>
+            </a:ext>
+          </a:extLst>
+        </p:spPr>
+      </p:pic>
+      <p:sp>
+        <p:nvSpPr>
+          <p:cNvPr id="19459" name="TextBox 1">
+            <a:extLst>
+              <a:ext uri="{FF2B5EF4-FFF2-40B4-BE49-F238E27FC236}">
+                <a16:creationId xmlns:a16="http://schemas.microsoft.com/office/drawing/2014/main" id="{D56FD110-9F55-A64B-BFA6-6EC61301EAF4}"/>
+              </a:ext>
+            </a:extLst>
+          </p:cNvPr>
+          <p:cNvSpPr txBox="1">
+            <a:spLocks noChangeArrowheads="1"/>
+          </p:cNvSpPr>
+          <p:nvPr/>
+        </p:nvSpPr>
+        <p:spPr bwMode="auto">
+          <a:xfrm>
+            <a:off x="1143000" y="609600"/>
+            <a:ext cx="7354888" cy="646113"/>
+          </a:xfrm>
+          <a:prstGeom prst="rect">
+            <a:avLst/>
+          </a:prstGeom>
+          <a:noFill/>
+          <a:ln>
+            <a:noFill/>
+          </a:ln>
+          <a:extLst>
+            <a:ext uri="{909E8E84-426E-40DD-AFC4-6F175D3DCCD1}">
+              <a14:hiddenFill xmlns:a14="http://schemas.microsoft.com/office/drawing/2010/main">
+                <a:solidFill>
+                  <a:srgbClr val="FFFFFF"/>
+                </a:solidFill>
+              </a14:hiddenFill>
+            </a:ext>
+            <a:ext uri="{91240B29-F687-4F45-9708-019B960494DF}">
+              <a14:hiddenLine xmlns:a14="http://schemas.microsoft.com/office/drawing/2010/main" w="9525">
+                <a:solidFill>
+                  <a:srgbClr val="000000"/>
+                </a:solidFill>
+                <a:miter lim="800000"/>
+                <a:headEnd/>
+                <a:tailEnd/>
+              </a14:hiddenLine>
+            </a:ext>
+          </a:extLst>
+        </p:spPr>
+        <p:txBody>
+          <a:bodyPr wrap="none">
+            <a:spAutoFit/>
+          </a:bodyPr>
+          <a:lstStyle>
+            <a:lvl1pPr eaLnBrk="0" hangingPunct="0">
+              <a:defRPr>
+                <a:solidFill>
+                  <a:schemeClr val="tx1"/>
+                </a:solidFill>
+                <a:latin typeface="Calibri" panose="020F0502020204030204" pitchFamily="34" charset="0"/>
+                <a:cs typeface="Arial" panose="020B0604020202020204" pitchFamily="34" charset="0"/>
+              </a:defRPr>
+            </a:lvl1pPr>
+            <a:lvl2pPr marL="742950" indent="-285750" eaLnBrk="0" hangingPunct="0">
+              <a:defRPr>
+                <a:solidFill>
+                  <a:schemeClr val="tx1"/>
+                </a:solidFill>
+                <a:latin typeface="Calibri" panose="020F0502020204030204" pitchFamily="34" charset="0"/>
+                <a:cs typeface="Arial" panose="020B0604020202020204" pitchFamily="34" charset="0"/>
+              </a:defRPr>
+            </a:lvl2pPr>
+            <a:lvl3pPr marL="1143000" indent="-228600" eaLnBrk="0" hangingPunct="0">
+              <a:defRPr>
+                <a:solidFill>
+                  <a:schemeClr val="tx1"/>
+                </a:solidFill>
+                <a:latin typeface="Calibri" panose="020F0502020204030204" pitchFamily="34" charset="0"/>
+                <a:cs typeface="Arial" panose="020B0604020202020204" pitchFamily="34" charset="0"/>
+              </a:defRPr>
+            </a:lvl3pPr>
+            <a:lvl4pPr marL="1600200" indent="-228600" eaLnBrk="0" hangingPunct="0">
+              <a:defRPr>
+                <a:solidFill>
+                  <a:schemeClr val="tx1"/>
+                </a:solidFill>
+                <a:latin typeface="Calibri" panose="020F0502020204030204" pitchFamily="34" charset="0"/>
+                <a:cs typeface="Arial" panose="020B0604020202020204" pitchFamily="34" charset="0"/>
+              </a:defRPr>
+            </a:lvl4pPr>
+            <a:lvl5pPr marL="2057400" indent="-228600" eaLnBrk="0" hangingPunct="0">
+              <a:defRPr>
+                <a:solidFill>
+                  <a:schemeClr val="tx1"/>
+                </a:solidFill>
+                <a:latin typeface="Calibri" panose="020F0502020204030204" pitchFamily="34" charset="0"/>
+                <a:cs typeface="Arial" panose="020B0604020202020204" pitchFamily="34" charset="0"/>
+              </a:defRPr>
+            </a:lvl5pPr>
+            <a:lvl6pPr marL="2514600" indent="-228600" eaLnBrk="0" fontAlgn="base" hangingPunct="0">
+              <a:spcBef>
+                <a:spcPct val="0"/>
+              </a:spcBef>
+              <a:spcAft>
+                <a:spcPct val="0"/>
+              </a:spcAft>
+              <a:defRPr>
+                <a:solidFill>
+                  <a:schemeClr val="tx1"/>
+                </a:solidFill>
+                <a:latin typeface="Calibri" panose="020F0502020204030204" pitchFamily="34" charset="0"/>
+                <a:cs typeface="Arial" panose="020B0604020202020204" pitchFamily="34" charset="0"/>
+              </a:defRPr>
+            </a:lvl6pPr>
+            <a:lvl7pPr marL="2971800" indent="-228600" eaLnBrk="0" fontAlgn="base" hangingPunct="0">
+              <a:spcBef>
+                <a:spcPct val="0"/>
+              </a:spcBef>
+              <a:spcAft>
+                <a:spcPct val="0"/>
+              </a:spcAft>
+              <a:defRPr>
+                <a:solidFill>
+                  <a:schemeClr val="tx1"/>
+                </a:solidFill>
+                <a:latin typeface="Calibri" panose="020F0502020204030204" pitchFamily="34" charset="0"/>
+                <a:cs typeface="Arial" panose="020B0604020202020204" pitchFamily="34" charset="0"/>
+              </a:defRPr>
+            </a:lvl7pPr>
+            <a:lvl8pPr marL="3429000" indent="-228600" eaLnBrk="0" fontAlgn="base" hangingPunct="0">
+              <a:spcBef>
+                <a:spcPct val="0"/>
+              </a:spcBef>
+              <a:spcAft>
+                <a:spcPct val="0"/>
+              </a:spcAft>
+              <a:defRPr>
+                <a:solidFill>
+                  <a:schemeClr val="tx1"/>
+                </a:solidFill>
+                <a:latin typeface="Calibri" panose="020F0502020204030204" pitchFamily="34" charset="0"/>
+                <a:cs typeface="Arial" panose="020B0604020202020204" pitchFamily="34" charset="0"/>
+              </a:defRPr>
+            </a:lvl8pPr>
+            <a:lvl9pPr marL="3886200" indent="-228600" eaLnBrk="0" fontAlgn="base" hangingPunct="0">
+              <a:spcBef>
+                <a:spcPct val="0"/>
+              </a:spcBef>
+              <a:spcAft>
+                <a:spcPct val="0"/>
+              </a:spcAft>
+              <a:defRPr>
+                <a:solidFill>
+                  <a:schemeClr val="tx1"/>
+                </a:solidFill>
+                <a:latin typeface="Calibri" panose="020F0502020204030204" pitchFamily="34" charset="0"/>
+                <a:cs typeface="Arial" panose="020B0604020202020204" pitchFamily="34" charset="0"/>
+              </a:defRPr>
+            </a:lvl9pPr>
+          </a:lstStyle>
+          <a:p>
+            <a:pPr eaLnBrk="1" hangingPunct="1"/>
+            <a:r>
+              <a:rPr lang="en-US" altLang="en-US" sz="3600"/>
+              <a:t>Using MODPATH With Deformed Grids</a:t>
+            </a:r>
+          </a:p>
+        </p:txBody>
+      </p:sp>
+      <p:sp>
+        <p:nvSpPr>
+          <p:cNvPr id="2" name="Oval 1">
+            <a:extLst>
+              <a:ext uri="{FF2B5EF4-FFF2-40B4-BE49-F238E27FC236}">
+                <a16:creationId xmlns:a16="http://schemas.microsoft.com/office/drawing/2014/main" id="{08BE48F3-2AC3-40A3-9852-EA14DF2C7A80}"/>
+              </a:ext>
+            </a:extLst>
+          </p:cNvPr>
+          <p:cNvSpPr/>
+          <p:nvPr/>
+        </p:nvSpPr>
+        <p:spPr>
+          <a:xfrm>
+            <a:off x="2781300" y="4406900"/>
+            <a:ext cx="76200" cy="76200"/>
+          </a:xfrm>
+          <a:prstGeom prst="ellipse">
+            <a:avLst/>
+          </a:prstGeom>
+        </p:spPr>
+        <p:style>
+          <a:lnRef idx="2">
+            <a:schemeClr val="accent1">
+              <a:shade val="50000"/>
+            </a:schemeClr>
+          </a:lnRef>
+          <a:fillRef idx="1">
+            <a:schemeClr val="accent1"/>
+          </a:fillRef>
+          <a:effectRef idx="0">
+            <a:schemeClr val="accent1"/>
+          </a:effectRef>
+          <a:fontRef idx="minor">
+            <a:schemeClr val="lt1"/>
+          </a:fontRef>
+        </p:style>
+        <p:txBody>
+          <a:bodyPr rtlCol="0" anchor="ctr"/>
+          <a:lstStyle/>
+          <a:p>
+            <a:pPr algn="ctr"/>
+            <a:endParaRPr lang="en-US"/>
+          </a:p>
+        </p:txBody>
+      </p:sp>
+      <p:sp>
+        <p:nvSpPr>
+          <p:cNvPr id="7" name="Oval 6">
+            <a:extLst>
+              <a:ext uri="{FF2B5EF4-FFF2-40B4-BE49-F238E27FC236}">
+                <a16:creationId xmlns:a16="http://schemas.microsoft.com/office/drawing/2014/main" id="{A5588FBB-AC4F-49BB-B378-AD5B915D70FB}"/>
+              </a:ext>
+            </a:extLst>
+          </p:cNvPr>
+          <p:cNvSpPr/>
+          <p:nvPr/>
+        </p:nvSpPr>
+        <p:spPr>
+          <a:xfrm>
+            <a:off x="2857500" y="4495800"/>
+            <a:ext cx="76200" cy="76200"/>
+          </a:xfrm>
+          <a:prstGeom prst="ellipse">
+            <a:avLst/>
+          </a:prstGeom>
+        </p:spPr>
+        <p:style>
+          <a:lnRef idx="2">
+            <a:schemeClr val="accent1">
+              <a:shade val="50000"/>
+            </a:schemeClr>
+          </a:lnRef>
+          <a:fillRef idx="1">
+            <a:schemeClr val="accent1"/>
+          </a:fillRef>
+          <a:effectRef idx="0">
+            <a:schemeClr val="accent1"/>
+          </a:effectRef>
+          <a:fontRef idx="minor">
+            <a:schemeClr val="lt1"/>
+          </a:fontRef>
+        </p:style>
+        <p:txBody>
+          <a:bodyPr rtlCol="0" anchor="ctr"/>
+          <a:lstStyle/>
+          <a:p>
+            <a:pPr algn="ctr"/>
+            <a:endParaRPr lang="en-US"/>
           </a:p>
         </p:txBody>
       </p:sp>
@@ -10976,7 +11348,7 @@
               <a:buChar char="•"/>
             </a:pPr>
             <a:r>
-              <a:rPr lang="en-US" altLang="en-US">
+              <a:rPr lang="en-US" altLang="en-US" dirty="0">
                 <a:solidFill>
                   <a:srgbClr val="0070C0"/>
                 </a:solidFill>
@@ -10984,14 +11356,14 @@
               <a:t>Flows from MODFLOW stress</a:t>
             </a:r>
             <a:br>
-              <a:rPr lang="en-US" altLang="en-US">
+              <a:rPr lang="en-US" altLang="en-US" dirty="0">
                 <a:solidFill>
                   <a:srgbClr val="0070C0"/>
                 </a:solidFill>
               </a:rPr>
             </a:br>
             <a:r>
-              <a:rPr lang="en-US" altLang="en-US">
+              <a:rPr lang="en-US" altLang="en-US" dirty="0">
                 <a:solidFill>
                   <a:srgbClr val="0070C0"/>
                 </a:solidFill>
@@ -10999,14 +11371,14 @@
               <a:t>packages often represent </a:t>
             </a:r>
             <a:br>
-              <a:rPr lang="en-US" altLang="en-US">
+              <a:rPr lang="en-US" altLang="en-US" dirty="0">
                 <a:solidFill>
                   <a:srgbClr val="0070C0"/>
                 </a:solidFill>
               </a:rPr>
             </a:br>
             <a:r>
-              <a:rPr lang="en-US" altLang="en-US">
+              <a:rPr lang="en-US" altLang="en-US" dirty="0">
                 <a:solidFill>
                   <a:srgbClr val="0070C0"/>
                 </a:solidFill>
@@ -11014,14 +11386,14 @@
               <a:t>boundary conditions at cell</a:t>
             </a:r>
             <a:br>
-              <a:rPr lang="en-US" altLang="en-US">
+              <a:rPr lang="en-US" altLang="en-US" dirty="0">
                 <a:solidFill>
                   <a:srgbClr val="0070C0"/>
                 </a:solidFill>
               </a:rPr>
             </a:br>
             <a:r>
-              <a:rPr lang="en-US" altLang="en-US">
+              <a:rPr lang="en-US" altLang="en-US" dirty="0">
                 <a:solidFill>
                   <a:srgbClr val="0070C0"/>
                 </a:solidFill>
@@ -11035,7 +11407,7 @@
               <a:buChar char="•"/>
             </a:pPr>
             <a:r>
-              <a:rPr lang="en-US" altLang="en-US">
+              <a:rPr lang="en-US" altLang="en-US" dirty="0">
                 <a:solidFill>
                   <a:srgbClr val="0070C0"/>
                 </a:solidFill>
@@ -11043,14 +11415,14 @@
               <a:t>To compute accurate velocities </a:t>
             </a:r>
             <a:br>
-              <a:rPr lang="en-US" altLang="en-US">
+              <a:rPr lang="en-US" altLang="en-US" dirty="0">
                 <a:solidFill>
                   <a:srgbClr val="0070C0"/>
                 </a:solidFill>
               </a:rPr>
             </a:br>
             <a:r>
-              <a:rPr lang="en-US" altLang="en-US">
+              <a:rPr lang="en-US" altLang="en-US" dirty="0">
                 <a:solidFill>
                   <a:srgbClr val="0070C0"/>
                 </a:solidFill>
@@ -11058,14 +11430,14 @@
               <a:t>in MODPATH it is necessary to</a:t>
             </a:r>
             <a:br>
-              <a:rPr lang="en-US" altLang="en-US">
+              <a:rPr lang="en-US" altLang="en-US" dirty="0">
                 <a:solidFill>
                   <a:srgbClr val="0070C0"/>
                 </a:solidFill>
               </a:rPr>
             </a:br>
             <a:r>
-              <a:rPr lang="en-US" altLang="en-US">
+              <a:rPr lang="en-US" altLang="en-US" dirty="0">
                 <a:solidFill>
                   <a:srgbClr val="0070C0"/>
                 </a:solidFill>
@@ -11073,14 +11445,14 @@
               <a:t>specify which faces have stress</a:t>
             </a:r>
             <a:br>
-              <a:rPr lang="en-US" altLang="en-US">
+              <a:rPr lang="en-US" altLang="en-US" dirty="0">
                 <a:solidFill>
                   <a:srgbClr val="0070C0"/>
                 </a:solidFill>
               </a:rPr>
             </a:br>
             <a:r>
-              <a:rPr lang="en-US" altLang="en-US">
+              <a:rPr lang="en-US" altLang="en-US" dirty="0">
                 <a:solidFill>
                   <a:srgbClr val="0070C0"/>
                 </a:solidFill>
@@ -11094,7 +11466,7 @@
               <a:buChar char="•"/>
             </a:pPr>
             <a:r>
-              <a:rPr lang="en-US" altLang="en-US">
+              <a:rPr lang="en-US" altLang="en-US" dirty="0">
                 <a:solidFill>
                   <a:srgbClr val="0070C0"/>
                 </a:solidFill>
@@ -11102,14 +11474,14 @@
               <a:t>The variable IFACE is an</a:t>
             </a:r>
             <a:br>
-              <a:rPr lang="en-US" altLang="en-US">
+              <a:rPr lang="en-US" altLang="en-US" dirty="0">
                 <a:solidFill>
                   <a:srgbClr val="0070C0"/>
                 </a:solidFill>
               </a:rPr>
             </a:br>
             <a:r>
-              <a:rPr lang="en-US" altLang="en-US">
+              <a:rPr lang="en-US" altLang="en-US" dirty="0">
                 <a:solidFill>
                   <a:srgbClr val="0070C0"/>
                 </a:solidFill>
@@ -11117,14 +11489,14 @@
               <a:t>integer flag that indicates</a:t>
             </a:r>
             <a:br>
-              <a:rPr lang="en-US" altLang="en-US">
+              <a:rPr lang="en-US" altLang="en-US" dirty="0">
                 <a:solidFill>
                   <a:srgbClr val="0070C0"/>
                 </a:solidFill>
               </a:rPr>
             </a:br>
             <a:r>
-              <a:rPr lang="en-US" altLang="en-US">
+              <a:rPr lang="en-US" altLang="en-US" dirty="0">
                 <a:solidFill>
                   <a:srgbClr val="0070C0"/>
                 </a:solidFill>
@@ -11132,14 +11504,14 @@
               <a:t>which face to associate with </a:t>
             </a:r>
             <a:br>
-              <a:rPr lang="en-US" altLang="en-US">
+              <a:rPr lang="en-US" altLang="en-US" dirty="0">
                 <a:solidFill>
                   <a:srgbClr val="0070C0"/>
                 </a:solidFill>
               </a:rPr>
             </a:br>
             <a:r>
-              <a:rPr lang="en-US" altLang="en-US">
+              <a:rPr lang="en-US" altLang="en-US" dirty="0">
                 <a:solidFill>
                   <a:srgbClr val="0070C0"/>
                 </a:solidFill>
@@ -11152,7 +11524,7 @@
               <a:buFont typeface="Arial" panose="020B0604020202020204" pitchFamily="34" charset="0"/>
               <a:buChar char="•"/>
             </a:pPr>
-            <a:endParaRPr lang="en-US" altLang="en-US"/>
+            <a:endParaRPr lang="en-US" altLang="en-US" dirty="0"/>
           </a:p>
         </p:txBody>
       </p:sp>

</xml_diff>